<commit_message>
Added Week 2 Presentation
</commit_message>
<xml_diff>
--- a/Presentations/Week2.pptx
+++ b/Presentations/Week2.pptx
@@ -112,10 +112,6 @@
     </a:lvl9pPr>
   </p:defaultTextStyle>
 </p:presentation>
-</file>
-
-<file path=ppt/revisionInfo.xml><?xml version="1.0" encoding="utf-8"?>
-<p1510:revInfo xmlns:a="http://schemas.openxmlformats.org/drawingml/2006/main" xmlns:r="http://schemas.openxmlformats.org/officeDocument/2006/relationships" xmlns:p1510="http://schemas.microsoft.com/office/powerpoint/2015/10/main"/>
 </file>
 
 <file path=ppt/slideLayouts/slideLayout1.xml><?xml version="1.0" encoding="utf-8"?>
@@ -5943,18 +5939,20 @@
         </p:nvSpPr>
         <p:spPr/>
         <p:txBody>
-          <a:bodyPr/>
-          <a:lstStyle/>
-          <a:p>
-            <a:r>
-              <a:rPr lang="en-US" dirty="0" err="1">
+          <a:bodyPr>
+            <a:normAutofit/>
+          </a:bodyPr>
+          <a:lstStyle/>
+          <a:p>
+            <a:r>
+              <a:rPr lang="en-US" sz="3600" dirty="0" err="1">
                 <a:latin typeface="Lato" panose="020F0502020204030203" pitchFamily="34" charset="0"/>
                 <a:ea typeface="Lato" panose="020F0502020204030203" pitchFamily="34" charset="0"/>
                 <a:cs typeface="Lato" panose="020F0502020204030203" pitchFamily="34" charset="0"/>
               </a:rPr>
               <a:t>Codefeed</a:t>
             </a:r>
-            <a:endParaRPr lang="en-US" dirty="0">
+            <a:endParaRPr lang="en-US" sz="3600" dirty="0">
               <a:latin typeface="Lato" panose="020F0502020204030203" pitchFamily="34" charset="0"/>
               <a:ea typeface="Lato" panose="020F0502020204030203" pitchFamily="34" charset="0"/>
               <a:cs typeface="Lato" panose="020F0502020204030203" pitchFamily="34" charset="0"/>

</xml_diff>